<commit_message>
automation start and WPT files
</commit_message>
<xml_diff>
--- a/ADK.pptx
+++ b/ADK.pptx
@@ -10700,6 +10700,22 @@
                 <a:cs typeface="Courier New" panose="02070309020205020404" pitchFamily="49" charset="0"/>
               </a:rPr>
               <a:t> for one assessment.</a:t>
+            </a:r>
+          </a:p>
+          <a:p>
+            <a:pPr marL="342900" indent="-342900" algn="l">
+              <a:spcBef>
+                <a:spcPts val="0"/>
+              </a:spcBef>
+              <a:buFont typeface="Arial" panose="020B0604020202020204" pitchFamily="34" charset="0"/>
+              <a:buChar char="•"/>
+            </a:pPr>
+            <a:r>
+              <a:rPr lang="en-US" altLang="zh-TW" dirty="0">
+                <a:latin typeface="Courier New" panose="02070309020205020404" pitchFamily="49" charset="0"/>
+                <a:cs typeface="Courier New" panose="02070309020205020404" pitchFamily="49" charset="0"/>
+              </a:rPr>
+              <a:t>One job could include multiple assessments</a:t>
             </a:r>
           </a:p>
         </p:txBody>

</xml_diff>